<commit_message>
Added features needed for hyper parameter optimization
- added validation and test metric
- added subgraph sampling (symmetric / asymmetric)
- added R file for result visualization (heatmap / graph)
- added arguments for console call
- added conda environment export file
- extended training visualization
</commit_message>
<xml_diff>
--- a/Summary.pptx
+++ b/Summary.pptx
@@ -270,7 +270,7 @@
           <a:p>
             <a:fld id="{2DB4A076-8EFC-F14E-A538-8E04EA523D60}" type="datetimeFigureOut">
               <a:rPr lang="en-US" smtClean="0"/>
-              <a:t>6/30/21</a:t>
+              <a:t>7/5/21</a:t>
             </a:fld>
             <a:endParaRPr lang="en-US"/>
           </a:p>
@@ -470,7 +470,7 @@
           <a:p>
             <a:fld id="{2DB4A076-8EFC-F14E-A538-8E04EA523D60}" type="datetimeFigureOut">
               <a:rPr lang="en-US" smtClean="0"/>
-              <a:t>6/30/21</a:t>
+              <a:t>7/5/21</a:t>
             </a:fld>
             <a:endParaRPr lang="en-US"/>
           </a:p>
@@ -680,7 +680,7 @@
           <a:p>
             <a:fld id="{2DB4A076-8EFC-F14E-A538-8E04EA523D60}" type="datetimeFigureOut">
               <a:rPr lang="en-US" smtClean="0"/>
-              <a:t>6/30/21</a:t>
+              <a:t>7/5/21</a:t>
             </a:fld>
             <a:endParaRPr lang="en-US"/>
           </a:p>
@@ -880,7 +880,7 @@
           <a:p>
             <a:fld id="{2DB4A076-8EFC-F14E-A538-8E04EA523D60}" type="datetimeFigureOut">
               <a:rPr lang="en-US" smtClean="0"/>
-              <a:t>6/30/21</a:t>
+              <a:t>7/5/21</a:t>
             </a:fld>
             <a:endParaRPr lang="en-US"/>
           </a:p>
@@ -1156,7 +1156,7 @@
           <a:p>
             <a:fld id="{2DB4A076-8EFC-F14E-A538-8E04EA523D60}" type="datetimeFigureOut">
               <a:rPr lang="en-US" smtClean="0"/>
-              <a:t>6/30/21</a:t>
+              <a:t>7/5/21</a:t>
             </a:fld>
             <a:endParaRPr lang="en-US"/>
           </a:p>
@@ -1424,7 +1424,7 @@
           <a:p>
             <a:fld id="{2DB4A076-8EFC-F14E-A538-8E04EA523D60}" type="datetimeFigureOut">
               <a:rPr lang="en-US" smtClean="0"/>
-              <a:t>6/30/21</a:t>
+              <a:t>7/5/21</a:t>
             </a:fld>
             <a:endParaRPr lang="en-US"/>
           </a:p>
@@ -1839,7 +1839,7 @@
           <a:p>
             <a:fld id="{2DB4A076-8EFC-F14E-A538-8E04EA523D60}" type="datetimeFigureOut">
               <a:rPr lang="en-US" smtClean="0"/>
-              <a:t>6/30/21</a:t>
+              <a:t>7/5/21</a:t>
             </a:fld>
             <a:endParaRPr lang="en-US"/>
           </a:p>
@@ -1981,7 +1981,7 @@
           <a:p>
             <a:fld id="{2DB4A076-8EFC-F14E-A538-8E04EA523D60}" type="datetimeFigureOut">
               <a:rPr lang="en-US" smtClean="0"/>
-              <a:t>6/30/21</a:t>
+              <a:t>7/5/21</a:t>
             </a:fld>
             <a:endParaRPr lang="en-US"/>
           </a:p>
@@ -2094,7 +2094,7 @@
           <a:p>
             <a:fld id="{2DB4A076-8EFC-F14E-A538-8E04EA523D60}" type="datetimeFigureOut">
               <a:rPr lang="en-US" smtClean="0"/>
-              <a:t>6/30/21</a:t>
+              <a:t>7/5/21</a:t>
             </a:fld>
             <a:endParaRPr lang="en-US"/>
           </a:p>
@@ -2407,7 +2407,7 @@
           <a:p>
             <a:fld id="{2DB4A076-8EFC-F14E-A538-8E04EA523D60}" type="datetimeFigureOut">
               <a:rPr lang="en-US" smtClean="0"/>
-              <a:t>6/30/21</a:t>
+              <a:t>7/5/21</a:t>
             </a:fld>
             <a:endParaRPr lang="en-US"/>
           </a:p>
@@ -2696,7 +2696,7 @@
           <a:p>
             <a:fld id="{2DB4A076-8EFC-F14E-A538-8E04EA523D60}" type="datetimeFigureOut">
               <a:rPr lang="en-US" smtClean="0"/>
-              <a:t>6/30/21</a:t>
+              <a:t>7/5/21</a:t>
             </a:fld>
             <a:endParaRPr lang="en-US"/>
           </a:p>
@@ -2939,7 +2939,7 @@
           <a:p>
             <a:fld id="{2DB4A076-8EFC-F14E-A538-8E04EA523D60}" type="datetimeFigureOut">
               <a:rPr lang="en-US" smtClean="0"/>
-              <a:t>6/30/21</a:t>
+              <a:t>7/5/21</a:t>
             </a:fld>
             <a:endParaRPr lang="en-US"/>
           </a:p>
@@ -3682,8 +3682,8 @@
         </p:blipFill>
         <p:spPr bwMode="auto">
           <a:xfrm>
-            <a:off x="7256834" y="1987769"/>
-            <a:ext cx="4466617" cy="2574552"/>
+            <a:off x="1049868" y="681037"/>
+            <a:ext cx="9860784" cy="5683743"/>
           </a:xfrm>
           <a:prstGeom prst="rect">
             <a:avLst/>
@@ -5060,7 +5060,7 @@
 </file>
 
 <file path=ppt/slides/slide7.xml><?xml version="1.0" encoding="utf-8"?>
-<p:sld xmlns:a="http://schemas.openxmlformats.org/drawingml/2006/main" xmlns:r="http://schemas.openxmlformats.org/officeDocument/2006/relationships" xmlns:p="http://schemas.openxmlformats.org/presentationml/2006/main">
+<p:sld xmlns:a="http://schemas.openxmlformats.org/drawingml/2006/main" xmlns:r="http://schemas.openxmlformats.org/officeDocument/2006/relationships" xmlns:p="http://schemas.openxmlformats.org/presentationml/2006/main" show="0">
   <p:cSld>
     <p:spTree>
       <p:nvGrpSpPr>
@@ -5587,7 +5587,7 @@
 </file>
 
 <file path=ppt/slides/slide8.xml><?xml version="1.0" encoding="utf-8"?>
-<p:sld xmlns:a="http://schemas.openxmlformats.org/drawingml/2006/main" xmlns:r="http://schemas.openxmlformats.org/officeDocument/2006/relationships" xmlns:p="http://schemas.openxmlformats.org/presentationml/2006/main">
+<p:sld xmlns:a="http://schemas.openxmlformats.org/drawingml/2006/main" xmlns:r="http://schemas.openxmlformats.org/officeDocument/2006/relationships" xmlns:p="http://schemas.openxmlformats.org/presentationml/2006/main" show="0">
   <p:cSld>
     <p:spTree>
       <p:nvGrpSpPr>
@@ -6190,123 +6190,208 @@
           <a:lstStyle/>
           <a:p>
             <a:r>
-              <a:rPr lang="en-US" sz="1800" dirty="0"/>
+              <a:rPr lang="en-US" sz="1600" dirty="0"/>
               <a:t>Symmetric vs asymmetric adjacency matrix </a:t>
             </a:r>
             <a:r>
-              <a:rPr lang="en-US" sz="1800" dirty="0">
+              <a:rPr lang="en-US" sz="1600" dirty="0">
                 <a:sym typeface="Wingdings" pitchFamily="2" charset="2"/>
               </a:rPr>
               <a:t> 2</a:t>
             </a:r>
-            <a:endParaRPr lang="en-US" sz="1800" dirty="0"/>
-          </a:p>
-          <a:p>
-            <a:r>
-              <a:rPr lang="en-US" sz="1800" dirty="0"/>
+            <a:endParaRPr lang="en-US" sz="1600" dirty="0"/>
+          </a:p>
+          <a:p>
+            <a:r>
+              <a:rPr lang="en-US" sz="1600" dirty="0"/>
               <a:t>Binary vs categorical cross entropy vs f1 loss </a:t>
             </a:r>
             <a:r>
-              <a:rPr lang="en-US" sz="1800" dirty="0">
+              <a:rPr lang="en-US" sz="1600" dirty="0">
                 <a:sym typeface="Wingdings" pitchFamily="2" charset="2"/>
               </a:rPr>
               <a:t> 3</a:t>
             </a:r>
-            <a:endParaRPr lang="en-US" sz="1800" dirty="0"/>
-          </a:p>
-          <a:p>
-            <a:r>
-              <a:rPr lang="en-US" sz="1800" dirty="0"/>
+            <a:endParaRPr lang="en-US" sz="1600" dirty="0"/>
+          </a:p>
+          <a:p>
+            <a:r>
+              <a:rPr lang="en-US" sz="1600" dirty="0"/>
               <a:t>Diagonal 0 or 1 </a:t>
             </a:r>
             <a:r>
-              <a:rPr lang="en-US" sz="1800" dirty="0">
+              <a:rPr lang="en-US" sz="1600" dirty="0">
                 <a:sym typeface="Wingdings" pitchFamily="2" charset="2"/>
               </a:rPr>
               <a:t> </a:t>
             </a:r>
             <a:r>
-              <a:rPr lang="en-US" sz="1800" dirty="0"/>
+              <a:rPr lang="en-US" sz="1600" dirty="0"/>
               <a:t>2</a:t>
             </a:r>
           </a:p>
           <a:p>
             <a:r>
-              <a:rPr lang="en-US" sz="1800" dirty="0"/>
+              <a:rPr lang="en-US" sz="1600" dirty="0">
+                <a:solidFill>
+                  <a:srgbClr val="FF0000"/>
+                </a:solidFill>
+              </a:rPr>
               <a:t>Train with different graphs (each cell / subgraphs)  or one graph </a:t>
             </a:r>
             <a:r>
-              <a:rPr lang="en-US" sz="1800" dirty="0">
+              <a:rPr lang="en-US" sz="1600" dirty="0">
+                <a:solidFill>
+                  <a:srgbClr val="FF0000"/>
+                </a:solidFill>
                 <a:sym typeface="Wingdings" pitchFamily="2" charset="2"/>
               </a:rPr>
               <a:t> 3</a:t>
             </a:r>
             <a:r>
-              <a:rPr lang="en-US" sz="1800" dirty="0"/>
+              <a:rPr lang="en-US" sz="1600" dirty="0">
+                <a:solidFill>
+                  <a:srgbClr val="FF0000"/>
+                </a:solidFill>
+              </a:rPr>
               <a:t> </a:t>
             </a:r>
           </a:p>
           <a:p>
             <a:r>
-              <a:rPr lang="en-US" sz="1800" dirty="0"/>
+              <a:rPr lang="en-US" sz="1600" dirty="0"/>
+              <a:t>removal of isolated nodes (Sparsity of input) </a:t>
+            </a:r>
+            <a:r>
+              <a:rPr lang="en-US" sz="1600" dirty="0">
+                <a:sym typeface="Wingdings" pitchFamily="2" charset="2"/>
+              </a:rPr>
+              <a:t> 2</a:t>
+            </a:r>
+            <a:endParaRPr lang="en-US" sz="1600" dirty="0"/>
+          </a:p>
+          <a:p>
+            <a:r>
+              <a:rPr lang="en-US" sz="1600" dirty="0"/>
               <a:t>Nr. of hidden dimensions</a:t>
             </a:r>
           </a:p>
           <a:p>
             <a:r>
-              <a:rPr lang="en-US" sz="1800" dirty="0"/>
+              <a:rPr lang="en-US" sz="1600" dirty="0"/>
+              <a:t>Nr. of hidden layers</a:t>
+            </a:r>
+          </a:p>
+          <a:p>
+            <a:r>
+              <a:rPr lang="en-US" sz="1600" dirty="0"/>
               <a:t>Nr. of latent dimensions</a:t>
             </a:r>
           </a:p>
           <a:p>
             <a:r>
-              <a:rPr lang="en-US" sz="1800" dirty="0"/>
+              <a:rPr lang="en-US" sz="1600" dirty="0"/>
               <a:t>%  of edges used for training</a:t>
             </a:r>
           </a:p>
           <a:p>
             <a:r>
-              <a:rPr lang="en-US" sz="1800" dirty="0"/>
+              <a:rPr lang="en-US" sz="1600" dirty="0"/>
               <a:t>Learning rate</a:t>
             </a:r>
           </a:p>
           <a:p>
             <a:r>
-              <a:rPr lang="en-US" sz="1800" dirty="0"/>
+              <a:rPr lang="en-US" sz="1600" dirty="0"/>
               <a:t>KL-divergence </a:t>
             </a:r>
             <a:r>
-              <a:rPr lang="en-US" sz="1800" dirty="0" err="1"/>
+              <a:rPr lang="en-US" sz="1600" dirty="0" err="1"/>
               <a:t>weigth</a:t>
             </a:r>
             <a:r>
-              <a:rPr lang="en-US" sz="1800" dirty="0"/>
+              <a:rPr lang="en-US" sz="1600" dirty="0"/>
               <a:t> (+warmup)</a:t>
             </a:r>
           </a:p>
           <a:p>
             <a:r>
-              <a:rPr lang="en-US" sz="1800" dirty="0"/>
-              <a:t>Sparsity of input</a:t>
-            </a:r>
-          </a:p>
-          <a:p>
-            <a:r>
-              <a:rPr lang="en-US" sz="1800" dirty="0"/>
+              <a:rPr lang="en-US" sz="1600" dirty="0">
+                <a:solidFill>
+                  <a:srgbClr val="FF0000"/>
+                </a:solidFill>
+              </a:rPr>
               <a:t>Node features</a:t>
             </a:r>
           </a:p>
           <a:p>
             <a:r>
-              <a:rPr lang="en-US" sz="1800" dirty="0"/>
+              <a:rPr lang="en-US" sz="1600" dirty="0"/>
               <a:t>Batch size</a:t>
             </a:r>
           </a:p>
           <a:p>
-            <a:endParaRPr lang="en-US" sz="1800" dirty="0"/>
-          </a:p>
-          <a:p>
-            <a:endParaRPr lang="en-US" sz="1800" dirty="0"/>
+            <a:endParaRPr lang="en-US" sz="1600" dirty="0"/>
+          </a:p>
+          <a:p>
+            <a:endParaRPr lang="en-US" sz="1600" dirty="0"/>
+          </a:p>
+        </p:txBody>
+      </p:sp>
+      <p:sp>
+        <p:nvSpPr>
+          <p:cNvPr id="5" name="Textfeld 4">
+            <a:extLst>
+              <a:ext uri="{FF2B5EF4-FFF2-40B4-BE49-F238E27FC236}">
+                <a16:creationId xmlns:a16="http://schemas.microsoft.com/office/drawing/2014/main" id="{48ECDDFC-B8F8-D946-B92B-8639411FE694}"/>
+              </a:ext>
+            </a:extLst>
+          </p:cNvPr>
+          <p:cNvSpPr txBox="1"/>
+          <p:nvPr/>
+        </p:nvSpPr>
+        <p:spPr>
+          <a:xfrm>
+            <a:off x="6931377" y="4357511"/>
+            <a:ext cx="4874796" cy="830997"/>
+          </a:xfrm>
+          <a:prstGeom prst="rect">
+            <a:avLst/>
+          </a:prstGeom>
+          <a:noFill/>
+        </p:spPr>
+        <p:txBody>
+          <a:bodyPr wrap="none" rtlCol="0">
+            <a:spAutoFit/>
+          </a:bodyPr>
+          <a:lstStyle/>
+          <a:p>
+            <a:pPr marL="342900" indent="-342900">
+              <a:buFont typeface="Wingdings" pitchFamily="2" charset="2"/>
+              <a:buChar char="à"/>
+            </a:pPr>
+            <a:r>
+              <a:rPr lang="en-US" sz="2400" dirty="0">
+                <a:solidFill>
+                  <a:srgbClr val="FF0000"/>
+                </a:solidFill>
+              </a:rPr>
+              <a:t>Cross validation</a:t>
+            </a:r>
+          </a:p>
+          <a:p>
+            <a:pPr marL="342900" indent="-342900">
+              <a:buFont typeface="Wingdings" pitchFamily="2" charset="2"/>
+              <a:buChar char="à"/>
+            </a:pPr>
+            <a:r>
+              <a:rPr lang="en-US" sz="2400" dirty="0">
+                <a:solidFill>
+                  <a:srgbClr val="FF0000"/>
+                </a:solidFill>
+              </a:rPr>
+              <a:t>Evaluation (directed vs undirected)</a:t>
+            </a:r>
           </a:p>
         </p:txBody>
       </p:sp>

</xml_diff>